<commit_message>
2022 February 9 - Minor changes in modeling notebook for curl memo.
</commit_message>
<xml_diff>
--- a/P7_presentation.pptx
+++ b/P7_presentation.pptx
@@ -212,6 +212,7 @@
           <a:p>
             <a:fld id="{11C06637-96B0-41C1-B245-409976E81BE3}" type="datetimeFigureOut">
               <a:rPr lang="fr-FR" smtClean="0"/>
+              <a:pPr/>
               <a:t>09/02/2022</a:t>
             </a:fld>
             <a:endParaRPr lang="fr-FR"/>
@@ -373,6 +374,7 @@
           <a:p>
             <a:fld id="{416BD788-896E-4CE9-BF75-66611F702051}" type="slidenum">
               <a:rPr lang="fr-FR" smtClean="0"/>
+              <a:pPr/>
               <a:t>‹N°›</a:t>
             </a:fld>
             <a:endParaRPr lang="fr-FR"/>
@@ -658,6 +660,7 @@
           <a:p>
             <a:fld id="{D753DA76-E271-44C0-927F-C103EB82CE5C}" type="datetime1">
               <a:rPr lang="fr-FR" smtClean="0"/>
+              <a:pPr/>
               <a:t>09/02/2022</a:t>
             </a:fld>
             <a:endParaRPr lang="fr-FR"/>
@@ -700,6 +703,7 @@
           <a:p>
             <a:fld id="{E596E0B2-3AF7-4EA7-81AB-850BF5C06221}" type="slidenum">
               <a:rPr lang="fr-FR" smtClean="0"/>
+              <a:pPr/>
               <a:t>‹N°›</a:t>
             </a:fld>
             <a:endParaRPr lang="fr-FR"/>
@@ -823,6 +827,7 @@
           <a:p>
             <a:fld id="{45F53CFD-6558-4924-A17F-B98288A122B3}" type="datetime1">
               <a:rPr lang="fr-FR" smtClean="0"/>
+              <a:pPr/>
               <a:t>09/02/2022</a:t>
             </a:fld>
             <a:endParaRPr lang="fr-FR"/>
@@ -865,6 +870,7 @@
           <a:p>
             <a:fld id="{E596E0B2-3AF7-4EA7-81AB-850BF5C06221}" type="slidenum">
               <a:rPr lang="fr-FR" smtClean="0"/>
+              <a:pPr/>
               <a:t>‹N°›</a:t>
             </a:fld>
             <a:endParaRPr lang="fr-FR"/>
@@ -998,6 +1004,7 @@
           <a:p>
             <a:fld id="{3F03477E-DFBF-4D4F-8EB4-1061DD3F2F34}" type="datetime1">
               <a:rPr lang="fr-FR" smtClean="0"/>
+              <a:pPr/>
               <a:t>09/02/2022</a:t>
             </a:fld>
             <a:endParaRPr lang="fr-FR"/>
@@ -1040,6 +1047,7 @@
           <a:p>
             <a:fld id="{E596E0B2-3AF7-4EA7-81AB-850BF5C06221}" type="slidenum">
               <a:rPr lang="fr-FR" smtClean="0"/>
+              <a:pPr/>
               <a:t>‹N°›</a:t>
             </a:fld>
             <a:endParaRPr lang="fr-FR"/>
@@ -1163,6 +1171,7 @@
           <a:p>
             <a:fld id="{F0E9BCCA-BC13-4C51-85F3-CB3AC1FF583F}" type="datetime1">
               <a:rPr lang="fr-FR" smtClean="0"/>
+              <a:pPr/>
               <a:t>09/02/2022</a:t>
             </a:fld>
             <a:endParaRPr lang="fr-FR"/>
@@ -1205,6 +1214,7 @@
           <a:p>
             <a:fld id="{E596E0B2-3AF7-4EA7-81AB-850BF5C06221}" type="slidenum">
               <a:rPr lang="fr-FR" smtClean="0"/>
+              <a:pPr/>
               <a:t>‹N°›</a:t>
             </a:fld>
             <a:endParaRPr lang="fr-FR"/>
@@ -1404,6 +1414,7 @@
           <a:p>
             <a:fld id="{A9209813-F23E-4A6B-86C0-E08B2B04D0C8}" type="datetime1">
               <a:rPr lang="fr-FR" smtClean="0"/>
+              <a:pPr/>
               <a:t>09/02/2022</a:t>
             </a:fld>
             <a:endParaRPr lang="fr-FR"/>
@@ -1446,6 +1457,7 @@
           <a:p>
             <a:fld id="{E596E0B2-3AF7-4EA7-81AB-850BF5C06221}" type="slidenum">
               <a:rPr lang="fr-FR" smtClean="0"/>
+              <a:pPr/>
               <a:t>‹N°›</a:t>
             </a:fld>
             <a:endParaRPr lang="fr-FR"/>
@@ -1687,6 +1699,7 @@
           <a:p>
             <a:fld id="{EE610731-4BDD-4D5B-B186-7C10A48C251A}" type="datetime1">
               <a:rPr lang="fr-FR" smtClean="0"/>
+              <a:pPr/>
               <a:t>09/02/2022</a:t>
             </a:fld>
             <a:endParaRPr lang="fr-FR"/>
@@ -1729,6 +1742,7 @@
           <a:p>
             <a:fld id="{E596E0B2-3AF7-4EA7-81AB-850BF5C06221}" type="slidenum">
               <a:rPr lang="fr-FR" smtClean="0"/>
+              <a:pPr/>
               <a:t>‹N°›</a:t>
             </a:fld>
             <a:endParaRPr lang="fr-FR"/>
@@ -2104,6 +2118,7 @@
           <a:p>
             <a:fld id="{DCBD38B9-49D2-4EC3-83B3-409AC8B4A900}" type="datetime1">
               <a:rPr lang="fr-FR" smtClean="0"/>
+              <a:pPr/>
               <a:t>09/02/2022</a:t>
             </a:fld>
             <a:endParaRPr lang="fr-FR"/>
@@ -2146,6 +2161,7 @@
           <a:p>
             <a:fld id="{E596E0B2-3AF7-4EA7-81AB-850BF5C06221}" type="slidenum">
               <a:rPr lang="fr-FR" smtClean="0"/>
+              <a:pPr/>
               <a:t>‹N°›</a:t>
             </a:fld>
             <a:endParaRPr lang="fr-FR"/>
@@ -2217,6 +2233,7 @@
           <a:p>
             <a:fld id="{BDA7233F-4668-4751-9A5A-E1666619060A}" type="datetime1">
               <a:rPr lang="fr-FR" smtClean="0"/>
+              <a:pPr/>
               <a:t>09/02/2022</a:t>
             </a:fld>
             <a:endParaRPr lang="fr-FR"/>
@@ -2259,6 +2276,7 @@
           <a:p>
             <a:fld id="{E596E0B2-3AF7-4EA7-81AB-850BF5C06221}" type="slidenum">
               <a:rPr lang="fr-FR" smtClean="0"/>
+              <a:pPr/>
               <a:t>‹N°›</a:t>
             </a:fld>
             <a:endParaRPr lang="fr-FR"/>
@@ -2307,6 +2325,7 @@
           <a:p>
             <a:fld id="{AD0D07F5-A005-4876-BB3D-1834A94CC77E}" type="datetime1">
               <a:rPr lang="fr-FR" smtClean="0"/>
+              <a:pPr/>
               <a:t>09/02/2022</a:t>
             </a:fld>
             <a:endParaRPr lang="fr-FR"/>
@@ -2349,6 +2368,7 @@
           <a:p>
             <a:fld id="{E596E0B2-3AF7-4EA7-81AB-850BF5C06221}" type="slidenum">
               <a:rPr lang="fr-FR" smtClean="0"/>
+              <a:pPr/>
               <a:t>‹N°›</a:t>
             </a:fld>
             <a:endParaRPr lang="fr-FR"/>
@@ -2579,6 +2599,7 @@
           <a:p>
             <a:fld id="{F69B2A0C-550D-4ABB-A644-177CCA2A8976}" type="datetime1">
               <a:rPr lang="fr-FR" smtClean="0"/>
+              <a:pPr/>
               <a:t>09/02/2022</a:t>
             </a:fld>
             <a:endParaRPr lang="fr-FR"/>
@@ -2621,6 +2642,7 @@
           <a:p>
             <a:fld id="{E596E0B2-3AF7-4EA7-81AB-850BF5C06221}" type="slidenum">
               <a:rPr lang="fr-FR" smtClean="0"/>
+              <a:pPr/>
               <a:t>‹N°›</a:t>
             </a:fld>
             <a:endParaRPr lang="fr-FR"/>
@@ -2827,6 +2849,7 @@
           <a:p>
             <a:fld id="{80A20921-B0F9-46FF-BB56-E1B7AF5CFAC9}" type="datetime1">
               <a:rPr lang="fr-FR" smtClean="0"/>
+              <a:pPr/>
               <a:t>09/02/2022</a:t>
             </a:fld>
             <a:endParaRPr lang="fr-FR"/>
@@ -2869,6 +2892,7 @@
           <a:p>
             <a:fld id="{E596E0B2-3AF7-4EA7-81AB-850BF5C06221}" type="slidenum">
               <a:rPr lang="fr-FR" smtClean="0"/>
+              <a:pPr/>
               <a:t>‹N°›</a:t>
             </a:fld>
             <a:endParaRPr lang="fr-FR"/>
@@ -3035,6 +3059,7 @@
           <a:p>
             <a:fld id="{3D9EDCCF-024D-4C45-B17E-A84194A61197}" type="datetime1">
               <a:rPr lang="fr-FR" smtClean="0"/>
+              <a:pPr/>
               <a:t>09/02/2022</a:t>
             </a:fld>
             <a:endParaRPr lang="fr-FR"/>
@@ -3113,6 +3138,7 @@
           <a:p>
             <a:fld id="{E596E0B2-3AF7-4EA7-81AB-850BF5C06221}" type="slidenum">
               <a:rPr lang="fr-FR" smtClean="0"/>
+              <a:pPr/>
               <a:t>‹N°›</a:t>
             </a:fld>
             <a:endParaRPr lang="fr-FR"/>
@@ -3448,19 +3474,7 @@
             </a:br>
             <a:r>
               <a:rPr lang="fr-FR" sz="2800" dirty="0" smtClean="0"/>
-              <a:t>Projet </a:t>
-            </a:r>
-            <a:r>
-              <a:rPr lang="fr-FR" sz="2800" dirty="0" smtClean="0"/>
-              <a:t>7 </a:t>
-            </a:r>
-            <a:r>
-              <a:rPr lang="fr-FR" sz="2800" dirty="0" smtClean="0"/>
-              <a:t>: </a:t>
-            </a:r>
-            <a:r>
-              <a:rPr lang="fr-FR" sz="2800" dirty="0" smtClean="0"/>
-              <a:t>Implémentez un modèle de </a:t>
+              <a:t>Projet 7 : Implémentez un modèle de </a:t>
             </a:r>
             <a:r>
               <a:rPr lang="fr-FR" sz="2800" dirty="0" err="1" smtClean="0"/>
@@ -3709,6 +3723,7 @@
           <a:p>
             <a:fld id="{E596E0B2-3AF7-4EA7-81AB-850BF5C06221}" type="slidenum">
               <a:rPr lang="fr-FR" smtClean="0"/>
+              <a:pPr/>
               <a:t>1</a:t>
             </a:fld>
             <a:endParaRPr lang="fr-FR"/>
@@ -3720,6 +3735,13 @@
   <p:clrMapOvr>
     <a:masterClrMapping/>
   </p:clrMapOvr>
+  <p:timing>
+    <p:tnLst>
+      <p:par>
+        <p:cTn id="1" dur="indefinite" restart="never" nodeType="tmRoot"/>
+      </p:par>
+    </p:tnLst>
+  </p:timing>
 </p:sld>
 </file>
 
@@ -5988,6 +6010,7 @@
           <a:p>
             <a:fld id="{E596E0B2-3AF7-4EA7-81AB-850BF5C06221}" type="slidenum">
               <a:rPr lang="fr-FR" smtClean="0"/>
+              <a:pPr/>
               <a:t>10</a:t>
             </a:fld>
             <a:endParaRPr lang="fr-FR"/>
@@ -6354,6 +6377,13 @@
   <p:clrMapOvr>
     <a:masterClrMapping/>
   </p:clrMapOvr>
+  <p:timing>
+    <p:tnLst>
+      <p:par>
+        <p:cTn id="1" dur="indefinite" restart="never" nodeType="tmRoot"/>
+      </p:par>
+    </p:tnLst>
+  </p:timing>
 </p:sld>
 </file>
 
@@ -8622,6 +8652,7 @@
           <a:p>
             <a:fld id="{E596E0B2-3AF7-4EA7-81AB-850BF5C06221}" type="slidenum">
               <a:rPr lang="fr-FR" smtClean="0"/>
+              <a:pPr/>
               <a:t>11</a:t>
             </a:fld>
             <a:endParaRPr lang="fr-FR"/>
@@ -9892,6 +9923,7 @@
           <a:p>
             <a:fld id="{E596E0B2-3AF7-4EA7-81AB-850BF5C06221}" type="slidenum">
               <a:rPr lang="fr-FR" smtClean="0"/>
+              <a:pPr/>
               <a:t>12</a:t>
             </a:fld>
             <a:endParaRPr lang="fr-FR"/>
@@ -10937,6 +10969,7 @@
           <a:p>
             <a:fld id="{E596E0B2-3AF7-4EA7-81AB-850BF5C06221}" type="slidenum">
               <a:rPr lang="fr-FR" smtClean="0"/>
+              <a:pPr/>
               <a:t>13</a:t>
             </a:fld>
             <a:endParaRPr lang="fr-FR"/>
@@ -11741,6 +11774,7 @@
           <a:p>
             <a:fld id="{E596E0B2-3AF7-4EA7-81AB-850BF5C06221}" type="slidenum">
               <a:rPr lang="fr-FR" smtClean="0"/>
+              <a:pPr/>
               <a:t>14</a:t>
             </a:fld>
             <a:endParaRPr lang="fr-FR"/>
@@ -12639,6 +12673,7 @@
           <a:p>
             <a:fld id="{E596E0B2-3AF7-4EA7-81AB-850BF5C06221}" type="slidenum">
               <a:rPr lang="fr-FR" smtClean="0"/>
+              <a:pPr/>
               <a:t>15</a:t>
             </a:fld>
             <a:endParaRPr lang="fr-FR"/>
@@ -13658,6 +13693,7 @@
           <a:p>
             <a:fld id="{E596E0B2-3AF7-4EA7-81AB-850BF5C06221}" type="slidenum">
               <a:rPr lang="fr-FR" smtClean="0"/>
+              <a:pPr/>
               <a:t>16</a:t>
             </a:fld>
             <a:endParaRPr lang="fr-FR"/>
@@ -14664,6 +14700,7 @@
           <a:p>
             <a:fld id="{E596E0B2-3AF7-4EA7-81AB-850BF5C06221}" type="slidenum">
               <a:rPr lang="fr-FR" smtClean="0"/>
+              <a:pPr/>
               <a:t>17</a:t>
             </a:fld>
             <a:endParaRPr lang="fr-FR"/>
@@ -15828,6 +15865,7 @@
           <a:p>
             <a:fld id="{E596E0B2-3AF7-4EA7-81AB-850BF5C06221}" type="slidenum">
               <a:rPr lang="fr-FR" smtClean="0"/>
+              <a:pPr/>
               <a:t>18</a:t>
             </a:fld>
             <a:endParaRPr lang="fr-FR"/>
@@ -17204,6 +17242,7 @@
           <a:p>
             <a:fld id="{E596E0B2-3AF7-4EA7-81AB-850BF5C06221}" type="slidenum">
               <a:rPr lang="fr-FR" smtClean="0"/>
+              <a:pPr/>
               <a:t>19</a:t>
             </a:fld>
             <a:endParaRPr lang="fr-FR"/>
@@ -20366,6 +20405,7 @@
           <a:p>
             <a:fld id="{E596E0B2-3AF7-4EA7-81AB-850BF5C06221}" type="slidenum">
               <a:rPr lang="fr-FR" smtClean="0"/>
+              <a:pPr/>
               <a:t>2</a:t>
             </a:fld>
             <a:endParaRPr lang="fr-FR"/>
@@ -23564,6 +23604,7 @@
           <a:p>
             <a:fld id="{E596E0B2-3AF7-4EA7-81AB-850BF5C06221}" type="slidenum">
               <a:rPr lang="fr-FR" smtClean="0"/>
+              <a:pPr/>
               <a:t>20</a:t>
             </a:fld>
             <a:endParaRPr lang="fr-FR"/>
@@ -24532,6 +24573,7 @@
           <a:p>
             <a:fld id="{E596E0B2-3AF7-4EA7-81AB-850BF5C06221}" type="slidenum">
               <a:rPr lang="fr-FR" smtClean="0"/>
+              <a:pPr/>
               <a:t>21</a:t>
             </a:fld>
             <a:endParaRPr lang="fr-FR"/>
@@ -28316,6 +28358,7 @@
           <a:p>
             <a:fld id="{E596E0B2-3AF7-4EA7-81AB-850BF5C06221}" type="slidenum">
               <a:rPr lang="fr-FR" smtClean="0"/>
+              <a:pPr/>
               <a:t>3</a:t>
             </a:fld>
             <a:endParaRPr lang="fr-FR"/>
@@ -30398,6 +30441,7 @@
           <a:p>
             <a:fld id="{E596E0B2-3AF7-4EA7-81AB-850BF5C06221}" type="slidenum">
               <a:rPr lang="fr-FR" smtClean="0"/>
+              <a:pPr/>
               <a:t>4</a:t>
             </a:fld>
             <a:endParaRPr lang="fr-FR"/>
@@ -32639,6 +32683,7 @@
           <a:p>
             <a:fld id="{E596E0B2-3AF7-4EA7-81AB-850BF5C06221}" type="slidenum">
               <a:rPr lang="fr-FR" smtClean="0"/>
+              <a:pPr/>
               <a:t>5</a:t>
             </a:fld>
             <a:endParaRPr lang="fr-FR"/>
@@ -34951,6 +34996,7 @@
           <a:p>
             <a:fld id="{E596E0B2-3AF7-4EA7-81AB-850BF5C06221}" type="slidenum">
               <a:rPr lang="fr-FR" smtClean="0"/>
+              <a:pPr/>
               <a:t>6</a:t>
             </a:fld>
             <a:endParaRPr lang="fr-FR"/>
@@ -37237,6 +37283,7 @@
           <a:p>
             <a:fld id="{E596E0B2-3AF7-4EA7-81AB-850BF5C06221}" type="slidenum">
               <a:rPr lang="fr-FR" smtClean="0"/>
+              <a:pPr/>
               <a:t>7</a:t>
             </a:fld>
             <a:endParaRPr lang="fr-FR"/>
@@ -39969,6 +40016,7 @@
           <a:p>
             <a:fld id="{E596E0B2-3AF7-4EA7-81AB-850BF5C06221}" type="slidenum">
               <a:rPr lang="fr-FR" smtClean="0"/>
+              <a:pPr/>
               <a:t>8</a:t>
             </a:fld>
             <a:endParaRPr lang="fr-FR"/>
@@ -42592,6 +42640,7 @@
           <a:p>
             <a:fld id="{E596E0B2-3AF7-4EA7-81AB-850BF5C06221}" type="slidenum">
               <a:rPr lang="fr-FR" smtClean="0"/>
+              <a:pPr/>
               <a:t>9</a:t>
             </a:fld>
             <a:endParaRPr lang="fr-FR"/>

</xml_diff>